<commit_message>
Shorter meetin 2, add meeting 3
</commit_message>
<xml_diff>
--- a/book-club/book-club-meetings.pptx
+++ b/book-club/book-club-meetings.pptx
@@ -6,7 +6,8 @@
   </p:sldMasterIdLst>
   <p:sldIdLst>
     <p:sldId id="257" r:id="rId2"/>
-    <p:sldId id="258" r:id="rId3"/>
+    <p:sldId id="259" r:id="rId3"/>
+    <p:sldId id="258" r:id="rId4"/>
   </p:sldIdLst>
   <p:sldSz cx="12192000" cy="6858000"/>
   <p:notesSz cx="6858000" cy="9144000"/>
@@ -3366,7 +3367,7 @@
           <a:p>
             <a:r>
               <a:rPr lang="en-SE" dirty="0"/>
-              <a:t>Meeting 2</a:t>
+              <a:t>Meeting 3</a:t>
             </a:r>
           </a:p>
         </p:txBody>
@@ -3418,13 +3419,13 @@
         <p:spPr/>
         <p:txBody>
           <a:bodyPr>
-            <a:normAutofit fontScale="70000" lnSpcReduction="20000"/>
+            <a:normAutofit/>
           </a:bodyPr>
           <a:lstStyle/>
           <a:p>
             <a:r>
               <a:rPr lang="en-SE" dirty="0"/>
-              <a:t>Read chapter 3 and appendix B1, Tools for prioritization and B2, </a:t>
+              <a:t>Read appendix B1, Tools for prioritization and B2, </a:t>
             </a:r>
             <a:r>
               <a:rPr lang="en-GB" dirty="0"/>
@@ -3440,44 +3441,6 @@
               <a:buAutoNum type="arabicPeriod"/>
             </a:pPr>
             <a:r>
-              <a:rPr lang="en-GB" dirty="0"/>
-              <a:t>Reflect on fig. 4 (</a:t>
-            </a:r>
-            <a:r>
-              <a:rPr lang="en-GB" dirty="0" err="1"/>
-              <a:t>Bidragsmodellen</a:t>
-            </a:r>
-            <a:r>
-              <a:rPr lang="en-GB" dirty="0"/>
-              <a:t>). Does it match your view on leadership?</a:t>
-            </a:r>
-          </a:p>
-          <a:p>
-            <a:pPr marL="514350" indent="-514350">
-              <a:buFont typeface="+mj-lt"/>
-              <a:buAutoNum type="arabicPeriod"/>
-            </a:pPr>
-            <a:r>
-              <a:rPr lang="en-GB" dirty="0"/>
-              <a:t>How are goals and visions anchored at the company? Any similarities/difference with what is described in section 3.3?</a:t>
-            </a:r>
-          </a:p>
-          <a:p>
-            <a:pPr marL="514350" indent="-514350">
-              <a:buFont typeface="+mj-lt"/>
-              <a:buAutoNum type="arabicPeriod"/>
-            </a:pPr>
-            <a:r>
-              <a:rPr lang="en-SE" dirty="0"/>
-              <a:t>Do you have any good or bad examples related to what you have read?</a:t>
-            </a:r>
-          </a:p>
-          <a:p>
-            <a:pPr marL="514350" indent="-514350">
-              <a:buFont typeface="+mj-lt"/>
-              <a:buAutoNum type="arabicPeriod"/>
-            </a:pPr>
-            <a:r>
               <a:rPr lang="en-SE" dirty="0"/>
               <a:t>Try to test something you have learnt (ideally until next time!)</a:t>
             </a:r>
@@ -3531,15 +3494,9 @@
         <p:spPr/>
         <p:txBody>
           <a:bodyPr>
-            <a:normAutofit fontScale="70000" lnSpcReduction="20000"/>
+            <a:normAutofit/>
           </a:bodyPr>
           <a:lstStyle/>
-          <a:p>
-            <a:r>
-              <a:rPr lang="en-SE" dirty="0"/>
-              <a:t>Discuss the preparation questions in smaller groups and share whith all</a:t>
-            </a:r>
-          </a:p>
           <a:p>
             <a:r>
               <a:rPr lang="en-SE" dirty="0"/>
@@ -3568,6 +3525,241 @@
 </file>
 
 <file path=ppt/slides/slide2.xml><?xml version="1.0" encoding="utf-8"?>
+<p:sld xmlns:a="http://schemas.openxmlformats.org/drawingml/2006/main" xmlns:r="http://schemas.openxmlformats.org/officeDocument/2006/relationships" xmlns:p="http://schemas.openxmlformats.org/presentationml/2006/main">
+  <p:cSld>
+    <p:spTree>
+      <p:nvGrpSpPr>
+        <p:cNvPr id="1" name="">
+          <a:extLst>
+            <a:ext uri="{FF2B5EF4-FFF2-40B4-BE49-F238E27FC236}">
+              <a16:creationId xmlns:a16="http://schemas.microsoft.com/office/drawing/2014/main" id="{066E1A7C-D43F-DD12-DA41-7CC8DFBCCE5E}"/>
+            </a:ext>
+          </a:extLst>
+        </p:cNvPr>
+        <p:cNvGrpSpPr/>
+        <p:nvPr/>
+      </p:nvGrpSpPr>
+      <p:grpSpPr>
+        <a:xfrm>
+          <a:off x="0" y="0"/>
+          <a:ext cx="0" cy="0"/>
+          <a:chOff x="0" y="0"/>
+          <a:chExt cx="0" cy="0"/>
+        </a:xfrm>
+      </p:grpSpPr>
+      <p:sp>
+        <p:nvSpPr>
+          <p:cNvPr id="2" name="Title 1">
+            <a:extLst>
+              <a:ext uri="{FF2B5EF4-FFF2-40B4-BE49-F238E27FC236}">
+                <a16:creationId xmlns:a16="http://schemas.microsoft.com/office/drawing/2014/main" id="{B211E20C-85B3-1235-EFFD-EE48D72B4FFA}"/>
+              </a:ext>
+            </a:extLst>
+          </p:cNvPr>
+          <p:cNvSpPr>
+            <a:spLocks noGrp="1"/>
+          </p:cNvSpPr>
+          <p:nvPr>
+            <p:ph type="title"/>
+          </p:nvPr>
+        </p:nvSpPr>
+        <p:spPr/>
+        <p:txBody>
+          <a:bodyPr/>
+          <a:lstStyle/>
+          <a:p>
+            <a:r>
+              <a:rPr lang="en-SE" dirty="0"/>
+              <a:t>Meeting 2</a:t>
+            </a:r>
+          </a:p>
+        </p:txBody>
+      </p:sp>
+      <p:sp>
+        <p:nvSpPr>
+          <p:cNvPr id="3" name="Text Placeholder 2">
+            <a:extLst>
+              <a:ext uri="{FF2B5EF4-FFF2-40B4-BE49-F238E27FC236}">
+                <a16:creationId xmlns:a16="http://schemas.microsoft.com/office/drawing/2014/main" id="{E521176E-0398-3C95-E418-BADD724FE113}"/>
+              </a:ext>
+            </a:extLst>
+          </p:cNvPr>
+          <p:cNvSpPr>
+            <a:spLocks noGrp="1"/>
+          </p:cNvSpPr>
+          <p:nvPr>
+            <p:ph type="body" idx="1"/>
+          </p:nvPr>
+        </p:nvSpPr>
+        <p:spPr/>
+        <p:txBody>
+          <a:bodyPr/>
+          <a:lstStyle/>
+          <a:p>
+            <a:r>
+              <a:rPr lang="en-SE" dirty="0"/>
+              <a:t>Preparation</a:t>
+            </a:r>
+          </a:p>
+        </p:txBody>
+      </p:sp>
+      <p:sp>
+        <p:nvSpPr>
+          <p:cNvPr id="4" name="Content Placeholder 3">
+            <a:extLst>
+              <a:ext uri="{FF2B5EF4-FFF2-40B4-BE49-F238E27FC236}">
+                <a16:creationId xmlns:a16="http://schemas.microsoft.com/office/drawing/2014/main" id="{D8206B09-4FA1-BCAB-70E8-261963D70104}"/>
+              </a:ext>
+            </a:extLst>
+          </p:cNvPr>
+          <p:cNvSpPr>
+            <a:spLocks noGrp="1"/>
+          </p:cNvSpPr>
+          <p:nvPr>
+            <p:ph sz="half" idx="2"/>
+          </p:nvPr>
+        </p:nvSpPr>
+        <p:spPr/>
+        <p:txBody>
+          <a:bodyPr>
+            <a:normAutofit fontScale="77500" lnSpcReduction="20000"/>
+          </a:bodyPr>
+          <a:lstStyle/>
+          <a:p>
+            <a:r>
+              <a:rPr lang="en-SE" dirty="0"/>
+              <a:t>Read chapter 3</a:t>
+            </a:r>
+            <a:endParaRPr lang="en-GB" dirty="0"/>
+          </a:p>
+          <a:p>
+            <a:pPr marL="514350" indent="-514350">
+              <a:buFont typeface="+mj-lt"/>
+              <a:buAutoNum type="arabicPeriod"/>
+            </a:pPr>
+            <a:r>
+              <a:rPr lang="en-GB" dirty="0"/>
+              <a:t>Reflect on fig. 4 (</a:t>
+            </a:r>
+            <a:r>
+              <a:rPr lang="en-GB" dirty="0" err="1"/>
+              <a:t>Bidragsmodellen</a:t>
+            </a:r>
+            <a:r>
+              <a:rPr lang="en-GB" dirty="0"/>
+              <a:t>). Does it match your view on leadership?</a:t>
+            </a:r>
+          </a:p>
+          <a:p>
+            <a:pPr marL="514350" indent="-514350">
+              <a:buFont typeface="+mj-lt"/>
+              <a:buAutoNum type="arabicPeriod"/>
+            </a:pPr>
+            <a:r>
+              <a:rPr lang="en-GB" dirty="0"/>
+              <a:t>How are goals and visions anchored at the company? Any similarities/difference with what is described in section 3.3?</a:t>
+            </a:r>
+          </a:p>
+          <a:p>
+            <a:pPr marL="514350" indent="-514350">
+              <a:buFont typeface="+mj-lt"/>
+              <a:buAutoNum type="arabicPeriod"/>
+            </a:pPr>
+            <a:r>
+              <a:rPr lang="en-SE" dirty="0"/>
+              <a:t>Do you have any good or bad examples related to what you have read?</a:t>
+            </a:r>
+          </a:p>
+          <a:p>
+            <a:pPr marL="514350" indent="-514350">
+              <a:buFont typeface="+mj-lt"/>
+              <a:buAutoNum type="arabicPeriod"/>
+            </a:pPr>
+            <a:r>
+              <a:rPr lang="en-SE" dirty="0"/>
+              <a:t>Try to test something you have learnt (ideally until next time!)</a:t>
+            </a:r>
+          </a:p>
+        </p:txBody>
+      </p:sp>
+      <p:sp>
+        <p:nvSpPr>
+          <p:cNvPr id="5" name="Text Placeholder 4">
+            <a:extLst>
+              <a:ext uri="{FF2B5EF4-FFF2-40B4-BE49-F238E27FC236}">
+                <a16:creationId xmlns:a16="http://schemas.microsoft.com/office/drawing/2014/main" id="{216C10F5-C329-58CA-F7E6-44160848B9F0}"/>
+              </a:ext>
+            </a:extLst>
+          </p:cNvPr>
+          <p:cNvSpPr>
+            <a:spLocks noGrp="1"/>
+          </p:cNvSpPr>
+          <p:nvPr>
+            <p:ph type="body" sz="quarter" idx="3"/>
+          </p:nvPr>
+        </p:nvSpPr>
+        <p:spPr/>
+        <p:txBody>
+          <a:bodyPr/>
+          <a:lstStyle/>
+          <a:p>
+            <a:r>
+              <a:rPr lang="en-SE" dirty="0"/>
+              <a:t>Agenda</a:t>
+            </a:r>
+          </a:p>
+        </p:txBody>
+      </p:sp>
+      <p:sp>
+        <p:nvSpPr>
+          <p:cNvPr id="6" name="Content Placeholder 5">
+            <a:extLst>
+              <a:ext uri="{FF2B5EF4-FFF2-40B4-BE49-F238E27FC236}">
+                <a16:creationId xmlns:a16="http://schemas.microsoft.com/office/drawing/2014/main" id="{CC3E9C16-A136-D05A-D4DB-8F743C249C82}"/>
+              </a:ext>
+            </a:extLst>
+          </p:cNvPr>
+          <p:cNvSpPr>
+            <a:spLocks noGrp="1"/>
+          </p:cNvSpPr>
+          <p:nvPr>
+            <p:ph sz="quarter" idx="4"/>
+          </p:nvPr>
+        </p:nvSpPr>
+        <p:spPr/>
+        <p:txBody>
+          <a:bodyPr>
+            <a:normAutofit fontScale="77500" lnSpcReduction="20000"/>
+          </a:bodyPr>
+          <a:lstStyle/>
+          <a:p>
+            <a:r>
+              <a:rPr lang="en-SE" dirty="0"/>
+              <a:t>Discuss the preparation questions in smaller groups and share whith all</a:t>
+            </a:r>
+          </a:p>
+          <a:p>
+            <a:r>
+              <a:rPr lang="en-SE" dirty="0"/>
+              <a:t>Share experiences of what you have tested from your learning</a:t>
+            </a:r>
+          </a:p>
+        </p:txBody>
+      </p:sp>
+    </p:spTree>
+    <p:extLst>
+      <p:ext uri="{BB962C8B-B14F-4D97-AF65-F5344CB8AC3E}">
+        <p14:creationId xmlns:p14="http://schemas.microsoft.com/office/powerpoint/2010/main" val="389270254"/>
+      </p:ext>
+    </p:extLst>
+  </p:cSld>
+  <p:clrMapOvr>
+    <a:masterClrMapping/>
+  </p:clrMapOvr>
+</p:sld>
+</file>
+
+<file path=ppt/slides/slide3.xml><?xml version="1.0" encoding="utf-8"?>
 <p:sld xmlns:a="http://schemas.openxmlformats.org/drawingml/2006/main" xmlns:r="http://schemas.openxmlformats.org/officeDocument/2006/relationships" xmlns:p="http://schemas.openxmlformats.org/presentationml/2006/main">
   <p:cSld>
     <p:spTree>

</xml_diff>